<commit_message>
ppt and python while and range
</commit_message>
<xml_diff>
--- a/4_sql/project''/hospital_management.pptx
+++ b/4_sql/project''/hospital_management.pptx
@@ -63,6 +63,18 @@
     <p:sldId id="314" r:id="rId57"/>
     <p:sldId id="315" r:id="rId58"/>
     <p:sldId id="316" r:id="rId59"/>
+    <p:sldId id="317" r:id="rId60"/>
+    <p:sldId id="318" r:id="rId61"/>
+    <p:sldId id="319" r:id="rId62"/>
+    <p:sldId id="320" r:id="rId63"/>
+    <p:sldId id="321" r:id="rId64"/>
+    <p:sldId id="322" r:id="rId65"/>
+    <p:sldId id="323" r:id="rId66"/>
+    <p:sldId id="324" r:id="rId67"/>
+    <p:sldId id="325" r:id="rId68"/>
+    <p:sldId id="326" r:id="rId69"/>
+    <p:sldId id="327" r:id="rId70"/>
+    <p:sldId id="328" r:id="rId71"/>
   </p:sldIdLst>
   <p:sldSz cx="12192000" cy="6858000"/>
   <p:notesSz cx="6858000" cy="9144000"/>
@@ -312,7 +324,7 @@
           <a:p>
             <a:fld id="{82B865A7-C0DA-4AB5-ACAE-01B1232FB320}" type="datetimeFigureOut">
               <a:rPr lang="en-IN" smtClean="0"/>
-              <a:t>09-01-2025</a:t>
+              <a:t>13-01-2025</a:t>
             </a:fld>
             <a:endParaRPr lang="en-IN"/>
           </a:p>
@@ -482,7 +494,7 @@
           <a:p>
             <a:fld id="{82B865A7-C0DA-4AB5-ACAE-01B1232FB320}" type="datetimeFigureOut">
               <a:rPr lang="en-IN" smtClean="0"/>
-              <a:t>09-01-2025</a:t>
+              <a:t>13-01-2025</a:t>
             </a:fld>
             <a:endParaRPr lang="en-IN"/>
           </a:p>
@@ -662,7 +674,7 @@
           <a:p>
             <a:fld id="{82B865A7-C0DA-4AB5-ACAE-01B1232FB320}" type="datetimeFigureOut">
               <a:rPr lang="en-IN" smtClean="0"/>
-              <a:t>09-01-2025</a:t>
+              <a:t>13-01-2025</a:t>
             </a:fld>
             <a:endParaRPr lang="en-IN"/>
           </a:p>
@@ -832,7 +844,7 @@
           <a:p>
             <a:fld id="{82B865A7-C0DA-4AB5-ACAE-01B1232FB320}" type="datetimeFigureOut">
               <a:rPr lang="en-IN" smtClean="0"/>
-              <a:t>09-01-2025</a:t>
+              <a:t>13-01-2025</a:t>
             </a:fld>
             <a:endParaRPr lang="en-IN"/>
           </a:p>
@@ -1078,7 +1090,7 @@
           <a:p>
             <a:fld id="{82B865A7-C0DA-4AB5-ACAE-01B1232FB320}" type="datetimeFigureOut">
               <a:rPr lang="en-IN" smtClean="0"/>
-              <a:t>09-01-2025</a:t>
+              <a:t>13-01-2025</a:t>
             </a:fld>
             <a:endParaRPr lang="en-IN"/>
           </a:p>
@@ -1310,7 +1322,7 @@
           <a:p>
             <a:fld id="{82B865A7-C0DA-4AB5-ACAE-01B1232FB320}" type="datetimeFigureOut">
               <a:rPr lang="en-IN" smtClean="0"/>
-              <a:t>09-01-2025</a:t>
+              <a:t>13-01-2025</a:t>
             </a:fld>
             <a:endParaRPr lang="en-IN"/>
           </a:p>
@@ -1677,7 +1689,7 @@
           <a:p>
             <a:fld id="{82B865A7-C0DA-4AB5-ACAE-01B1232FB320}" type="datetimeFigureOut">
               <a:rPr lang="en-IN" smtClean="0"/>
-              <a:t>09-01-2025</a:t>
+              <a:t>13-01-2025</a:t>
             </a:fld>
             <a:endParaRPr lang="en-IN"/>
           </a:p>
@@ -1795,7 +1807,7 @@
           <a:p>
             <a:fld id="{82B865A7-C0DA-4AB5-ACAE-01B1232FB320}" type="datetimeFigureOut">
               <a:rPr lang="en-IN" smtClean="0"/>
-              <a:t>09-01-2025</a:t>
+              <a:t>13-01-2025</a:t>
             </a:fld>
             <a:endParaRPr lang="en-IN"/>
           </a:p>
@@ -1890,7 +1902,7 @@
           <a:p>
             <a:fld id="{82B865A7-C0DA-4AB5-ACAE-01B1232FB320}" type="datetimeFigureOut">
               <a:rPr lang="en-IN" smtClean="0"/>
-              <a:t>09-01-2025</a:t>
+              <a:t>13-01-2025</a:t>
             </a:fld>
             <a:endParaRPr lang="en-IN"/>
           </a:p>
@@ -2174,7 +2186,7 @@
           <a:p>
             <a:fld id="{82B865A7-C0DA-4AB5-ACAE-01B1232FB320}" type="datetimeFigureOut">
               <a:rPr lang="en-IN" smtClean="0"/>
-              <a:t>09-01-2025</a:t>
+              <a:t>13-01-2025</a:t>
             </a:fld>
             <a:endParaRPr lang="en-IN"/>
           </a:p>
@@ -2427,7 +2439,7 @@
           <a:p>
             <a:fld id="{82B865A7-C0DA-4AB5-ACAE-01B1232FB320}" type="datetimeFigureOut">
               <a:rPr lang="en-IN" smtClean="0"/>
-              <a:t>09-01-2025</a:t>
+              <a:t>13-01-2025</a:t>
             </a:fld>
             <a:endParaRPr lang="en-IN"/>
           </a:p>
@@ -2650,7 +2662,7 @@
           <a:p>
             <a:fld id="{82B865A7-C0DA-4AB5-ACAE-01B1232FB320}" type="datetimeFigureOut">
               <a:rPr lang="en-IN" smtClean="0"/>
-              <a:t>09-01-2025</a:t>
+              <a:t>13-01-2025</a:t>
             </a:fld>
             <a:endParaRPr lang="en-IN"/>
           </a:p>
@@ -11638,6 +11650,142 @@
           </a:p>
         </p:txBody>
       </p:sp>
+      <p:sp>
+        <p:nvSpPr>
+          <p:cNvPr id="3" name="TextBox 2"/>
+          <p:cNvSpPr txBox="1"/>
+          <p:nvPr/>
+        </p:nvSpPr>
+        <p:spPr>
+          <a:xfrm>
+            <a:off x="1595534" y="1063690"/>
+            <a:ext cx="8882743" cy="1015663"/>
+          </a:xfrm>
+          <a:prstGeom prst="rect">
+            <a:avLst/>
+          </a:prstGeom>
+          <a:noFill/>
+          <a:ln>
+            <a:solidFill>
+              <a:schemeClr val="tx1"/>
+            </a:solidFill>
+          </a:ln>
+        </p:spPr>
+        <p:txBody>
+          <a:bodyPr wrap="square" rtlCol="0">
+            <a:spAutoFit/>
+          </a:bodyPr>
+          <a:lstStyle/>
+          <a:p>
+            <a:r>
+              <a:rPr lang="en-IN" sz="2000" b="1" dirty="0" smtClean="0"/>
+              <a:t>CONSTRAINTS: </a:t>
+            </a:r>
+            <a:r>
+              <a:rPr lang="en-US" sz="2000" dirty="0"/>
+              <a:t>Constraint is a rule or condition that is applied to a table column or a set of columns to maintain the integrity, accuracy, and consistency of the data stored in the database.</a:t>
+            </a:r>
+            <a:endParaRPr lang="en-IN" sz="2000" dirty="0"/>
+          </a:p>
+        </p:txBody>
+      </p:sp>
+      <p:sp>
+        <p:nvSpPr>
+          <p:cNvPr id="4" name="TextBox 3"/>
+          <p:cNvSpPr txBox="1"/>
+          <p:nvPr/>
+        </p:nvSpPr>
+        <p:spPr>
+          <a:xfrm>
+            <a:off x="1595533" y="2313993"/>
+            <a:ext cx="8882743" cy="2554545"/>
+          </a:xfrm>
+          <a:prstGeom prst="rect">
+            <a:avLst/>
+          </a:prstGeom>
+          <a:noFill/>
+          <a:ln>
+            <a:solidFill>
+              <a:schemeClr val="tx1"/>
+            </a:solidFill>
+          </a:ln>
+        </p:spPr>
+        <p:txBody>
+          <a:bodyPr wrap="square" rtlCol="0">
+            <a:spAutoFit/>
+          </a:bodyPr>
+          <a:lstStyle/>
+          <a:p>
+            <a:r>
+              <a:rPr lang="en-IN" sz="2000" dirty="0" smtClean="0"/>
+              <a:t>There are different types of constraints that we can apply to the column of the table </a:t>
+            </a:r>
+          </a:p>
+          <a:p>
+            <a:endParaRPr lang="en-IN" sz="2000" dirty="0"/>
+          </a:p>
+          <a:p>
+            <a:pPr marL="342900" indent="-342900">
+              <a:buFont typeface="+mj-lt"/>
+              <a:buAutoNum type="arabicPeriod"/>
+            </a:pPr>
+            <a:r>
+              <a:rPr lang="en-IN" sz="2000" dirty="0" smtClean="0"/>
+              <a:t>NOT NULL</a:t>
+            </a:r>
+          </a:p>
+          <a:p>
+            <a:pPr marL="342900" indent="-342900">
+              <a:buFont typeface="+mj-lt"/>
+              <a:buAutoNum type="arabicPeriod"/>
+            </a:pPr>
+            <a:r>
+              <a:rPr lang="en-IN" sz="2000" dirty="0" smtClean="0"/>
+              <a:t>UNIQUE</a:t>
+            </a:r>
+          </a:p>
+          <a:p>
+            <a:pPr marL="342900" indent="-342900">
+              <a:buFont typeface="+mj-lt"/>
+              <a:buAutoNum type="arabicPeriod"/>
+            </a:pPr>
+            <a:r>
+              <a:rPr lang="en-IN" sz="2000" dirty="0" smtClean="0"/>
+              <a:t>DEFAULT</a:t>
+            </a:r>
+          </a:p>
+          <a:p>
+            <a:pPr marL="342900" indent="-342900">
+              <a:buFont typeface="+mj-lt"/>
+              <a:buAutoNum type="arabicPeriod"/>
+            </a:pPr>
+            <a:r>
+              <a:rPr lang="en-IN" sz="2000" dirty="0" smtClean="0"/>
+              <a:t>CHECK</a:t>
+            </a:r>
+          </a:p>
+          <a:p>
+            <a:pPr marL="342900" indent="-342900">
+              <a:buFont typeface="+mj-lt"/>
+              <a:buAutoNum type="arabicPeriod"/>
+            </a:pPr>
+            <a:r>
+              <a:rPr lang="en-IN" sz="2000" dirty="0" smtClean="0"/>
+              <a:t>PRIMARY KEY</a:t>
+            </a:r>
+          </a:p>
+          <a:p>
+            <a:pPr marL="342900" indent="-342900">
+              <a:buFont typeface="+mj-lt"/>
+              <a:buAutoNum type="arabicPeriod"/>
+            </a:pPr>
+            <a:r>
+              <a:rPr lang="en-IN" sz="2000" dirty="0" smtClean="0"/>
+              <a:t>FOREIGN KEY </a:t>
+            </a:r>
+          </a:p>
+        </p:txBody>
+      </p:sp>
     </p:spTree>
     <p:extLst>
       <p:ext uri="{BB962C8B-B14F-4D97-AF65-F5344CB8AC3E}">
@@ -11703,6 +11851,128 @@
           </a:p>
         </p:txBody>
       </p:sp>
+      <p:sp>
+        <p:nvSpPr>
+          <p:cNvPr id="4" name="TextBox 3"/>
+          <p:cNvSpPr txBox="1"/>
+          <p:nvPr/>
+        </p:nvSpPr>
+        <p:spPr>
+          <a:xfrm>
+            <a:off x="1866122" y="1296955"/>
+            <a:ext cx="7800392" cy="646331"/>
+          </a:xfrm>
+          <a:prstGeom prst="rect">
+            <a:avLst/>
+          </a:prstGeom>
+          <a:noFill/>
+          <a:ln>
+            <a:solidFill>
+              <a:schemeClr val="tx1"/>
+            </a:solidFill>
+          </a:ln>
+        </p:spPr>
+        <p:txBody>
+          <a:bodyPr wrap="square" rtlCol="0">
+            <a:spAutoFit/>
+          </a:bodyPr>
+          <a:lstStyle/>
+          <a:p>
+            <a:r>
+              <a:rPr lang="en-IN" b="1" dirty="0" smtClean="0"/>
+              <a:t>NOT NULL: </a:t>
+            </a:r>
+            <a:r>
+              <a:rPr lang="en-IN" dirty="0" smtClean="0"/>
+              <a:t>This ensures that a column cannot have a NULL VALUES, every row should have some values in it.</a:t>
+            </a:r>
+            <a:endParaRPr lang="en-IN" dirty="0"/>
+          </a:p>
+        </p:txBody>
+      </p:sp>
+      <p:pic>
+        <p:nvPicPr>
+          <p:cNvPr id="5" name="Picture 4"/>
+          <p:cNvPicPr>
+            <a:picLocks noChangeAspect="1"/>
+          </p:cNvPicPr>
+          <p:nvPr/>
+        </p:nvPicPr>
+        <p:blipFill>
+          <a:blip r:embed="rId2"/>
+          <a:stretch>
+            <a:fillRect/>
+          </a:stretch>
+        </p:blipFill>
+        <p:spPr>
+          <a:xfrm>
+            <a:off x="1866122" y="2976609"/>
+            <a:ext cx="5126299" cy="848942"/>
+          </a:xfrm>
+          <a:prstGeom prst="rect">
+            <a:avLst/>
+          </a:prstGeom>
+        </p:spPr>
+      </p:pic>
+      <p:pic>
+        <p:nvPicPr>
+          <p:cNvPr id="6" name="Picture 5"/>
+          <p:cNvPicPr>
+            <a:picLocks noChangeAspect="1"/>
+          </p:cNvPicPr>
+          <p:nvPr/>
+        </p:nvPicPr>
+        <p:blipFill>
+          <a:blip r:embed="rId3"/>
+          <a:stretch>
+            <a:fillRect/>
+          </a:stretch>
+        </p:blipFill>
+        <p:spPr>
+          <a:xfrm>
+            <a:off x="1866121" y="4213755"/>
+            <a:ext cx="5147473" cy="806114"/>
+          </a:xfrm>
+          <a:prstGeom prst="rect">
+            <a:avLst/>
+          </a:prstGeom>
+        </p:spPr>
+      </p:pic>
+      <p:sp>
+        <p:nvSpPr>
+          <p:cNvPr id="7" name="TextBox 6"/>
+          <p:cNvSpPr txBox="1"/>
+          <p:nvPr/>
+        </p:nvSpPr>
+        <p:spPr>
+          <a:xfrm>
+            <a:off x="1866122" y="2052734"/>
+            <a:ext cx="7800392" cy="369332"/>
+          </a:xfrm>
+          <a:prstGeom prst="rect">
+            <a:avLst/>
+          </a:prstGeom>
+          <a:noFill/>
+          <a:ln>
+            <a:solidFill>
+              <a:schemeClr val="tx1"/>
+            </a:solidFill>
+          </a:ln>
+        </p:spPr>
+        <p:txBody>
+          <a:bodyPr wrap="square" rtlCol="0">
+            <a:spAutoFit/>
+          </a:bodyPr>
+          <a:lstStyle/>
+          <a:p>
+            <a:r>
+              <a:rPr lang="en-IN" dirty="0" smtClean="0"/>
+              <a:t>Adding a NOT NULL constraint to the contact column in the patient table</a:t>
+            </a:r>
+            <a:endParaRPr lang="en-IN" dirty="0"/>
+          </a:p>
+        </p:txBody>
+      </p:sp>
     </p:spTree>
     <p:extLst>
       <p:ext uri="{BB962C8B-B14F-4D97-AF65-F5344CB8AC3E}">
@@ -11768,10 +12038,259 @@
           </a:p>
         </p:txBody>
       </p:sp>
+      <p:sp>
+        <p:nvSpPr>
+          <p:cNvPr id="3" name="TextBox 2"/>
+          <p:cNvSpPr txBox="1"/>
+          <p:nvPr/>
+        </p:nvSpPr>
+        <p:spPr>
+          <a:xfrm>
+            <a:off x="1698171" y="1259633"/>
+            <a:ext cx="7361853" cy="707886"/>
+          </a:xfrm>
+          <a:prstGeom prst="rect">
+            <a:avLst/>
+          </a:prstGeom>
+          <a:noFill/>
+          <a:ln>
+            <a:solidFill>
+              <a:schemeClr val="tx1"/>
+            </a:solidFill>
+          </a:ln>
+        </p:spPr>
+        <p:txBody>
+          <a:bodyPr wrap="square" rtlCol="0">
+            <a:spAutoFit/>
+          </a:bodyPr>
+          <a:lstStyle/>
+          <a:p>
+            <a:r>
+              <a:rPr lang="en-IN" sz="2000" dirty="0" smtClean="0">
+                <a:latin typeface="Arial Black" panose="020B0A04020102020204" pitchFamily="34" charset="0"/>
+              </a:rPr>
+              <a:t>UNIQUE: </a:t>
+            </a:r>
+            <a:r>
+              <a:rPr lang="en-IN" sz="2000" dirty="0" smtClean="0"/>
+              <a:t>It ensures that each row should have a unique value, it is mainly used for the contact/phone no. columns</a:t>
+            </a:r>
+            <a:endParaRPr lang="en-IN" sz="2000" dirty="0"/>
+          </a:p>
+        </p:txBody>
+      </p:sp>
+      <p:pic>
+        <p:nvPicPr>
+          <p:cNvPr id="4" name="Picture 3"/>
+          <p:cNvPicPr>
+            <a:picLocks noChangeAspect="1"/>
+          </p:cNvPicPr>
+          <p:nvPr/>
+        </p:nvPicPr>
+        <p:blipFill>
+          <a:blip r:embed="rId2"/>
+          <a:stretch>
+            <a:fillRect/>
+          </a:stretch>
+        </p:blipFill>
+        <p:spPr>
+          <a:xfrm>
+            <a:off x="1684587" y="2691354"/>
+            <a:ext cx="5169160" cy="854975"/>
+          </a:xfrm>
+          <a:prstGeom prst="rect">
+            <a:avLst/>
+          </a:prstGeom>
+        </p:spPr>
+      </p:pic>
+      <p:pic>
+        <p:nvPicPr>
+          <p:cNvPr id="5" name="Picture 4"/>
+          <p:cNvPicPr>
+            <a:picLocks noChangeAspect="1"/>
+          </p:cNvPicPr>
+          <p:nvPr/>
+        </p:nvPicPr>
+        <p:blipFill>
+          <a:blip r:embed="rId3"/>
+          <a:stretch>
+            <a:fillRect/>
+          </a:stretch>
+        </p:blipFill>
+        <p:spPr>
+          <a:xfrm>
+            <a:off x="1684587" y="4092883"/>
+            <a:ext cx="5196325" cy="933715"/>
+          </a:xfrm>
+          <a:prstGeom prst="rect">
+            <a:avLst/>
+          </a:prstGeom>
+        </p:spPr>
+      </p:pic>
     </p:spTree>
     <p:extLst>
       <p:ext uri="{BB962C8B-B14F-4D97-AF65-F5344CB8AC3E}">
         <p14:creationId xmlns:p14="http://schemas.microsoft.com/office/powerpoint/2010/main" val="1823971030"/>
+      </p:ext>
+    </p:extLst>
+  </p:cSld>
+  <p:clrMapOvr>
+    <a:masterClrMapping/>
+  </p:clrMapOvr>
+</p:sld>
+</file>
+
+<file path=ppt/slides/slide59.xml><?xml version="1.0" encoding="utf-8"?>
+<p:sld xmlns:a="http://schemas.openxmlformats.org/drawingml/2006/main" xmlns:r="http://schemas.openxmlformats.org/officeDocument/2006/relationships" xmlns:p="http://schemas.openxmlformats.org/presentationml/2006/main">
+  <p:cSld>
+    <p:spTree>
+      <p:nvGrpSpPr>
+        <p:cNvPr id="1" name=""/>
+        <p:cNvGrpSpPr/>
+        <p:nvPr/>
+      </p:nvGrpSpPr>
+      <p:grpSpPr>
+        <a:xfrm>
+          <a:off x="0" y="0"/>
+          <a:ext cx="0" cy="0"/>
+          <a:chOff x="0" y="0"/>
+          <a:chExt cx="0" cy="0"/>
+        </a:xfrm>
+      </p:grpSpPr>
+      <p:sp>
+        <p:nvSpPr>
+          <p:cNvPr id="2" name="TextBox 1"/>
+          <p:cNvSpPr txBox="1"/>
+          <p:nvPr/>
+        </p:nvSpPr>
+        <p:spPr>
+          <a:xfrm>
+            <a:off x="774440" y="233265"/>
+            <a:ext cx="10291666" cy="430887"/>
+          </a:xfrm>
+          <a:prstGeom prst="rect">
+            <a:avLst/>
+          </a:prstGeom>
+          <a:noFill/>
+        </p:spPr>
+        <p:txBody>
+          <a:bodyPr wrap="square" rtlCol="0">
+            <a:spAutoFit/>
+          </a:bodyPr>
+          <a:lstStyle/>
+          <a:p>
+            <a:pPr algn="ctr"/>
+            <a:r>
+              <a:rPr lang="en-IN" sz="2200" dirty="0" smtClean="0">
+                <a:latin typeface="Arial Black" panose="020B0A04020102020204" pitchFamily="34" charset="0"/>
+              </a:rPr>
+              <a:t>Queries</a:t>
+            </a:r>
+            <a:endParaRPr lang="en-IN" sz="2200" dirty="0">
+              <a:latin typeface="Arial Black" panose="020B0A04020102020204" pitchFamily="34" charset="0"/>
+            </a:endParaRPr>
+          </a:p>
+        </p:txBody>
+      </p:sp>
+      <p:pic>
+        <p:nvPicPr>
+          <p:cNvPr id="3" name="Picture 2"/>
+          <p:cNvPicPr>
+            <a:picLocks noChangeAspect="1"/>
+          </p:cNvPicPr>
+          <p:nvPr/>
+        </p:nvPicPr>
+        <p:blipFill>
+          <a:blip r:embed="rId2"/>
+          <a:stretch>
+            <a:fillRect/>
+          </a:stretch>
+        </p:blipFill>
+        <p:spPr>
+          <a:xfrm>
+            <a:off x="1632856" y="4390553"/>
+            <a:ext cx="8367485" cy="1044030"/>
+          </a:xfrm>
+          <a:prstGeom prst="rect">
+            <a:avLst/>
+          </a:prstGeom>
+        </p:spPr>
+      </p:pic>
+      <p:pic>
+        <p:nvPicPr>
+          <p:cNvPr id="4" name="Picture 3"/>
+          <p:cNvPicPr>
+            <a:picLocks noChangeAspect="1"/>
+          </p:cNvPicPr>
+          <p:nvPr/>
+        </p:nvPicPr>
+        <p:blipFill>
+          <a:blip r:embed="rId3">
+            <a:extLst>
+              <a:ext uri="{28A0092B-C50C-407E-A947-70E740481C1C}">
+                <a14:useLocalDpi xmlns:a14="http://schemas.microsoft.com/office/drawing/2010/main" val="0"/>
+              </a:ext>
+            </a:extLst>
+          </a:blip>
+          <a:stretch>
+            <a:fillRect/>
+          </a:stretch>
+        </p:blipFill>
+        <p:spPr>
+          <a:xfrm>
+            <a:off x="1632856" y="3005272"/>
+            <a:ext cx="4854361" cy="922100"/>
+          </a:xfrm>
+          <a:prstGeom prst="rect">
+            <a:avLst/>
+          </a:prstGeom>
+        </p:spPr>
+      </p:pic>
+      <p:sp>
+        <p:nvSpPr>
+          <p:cNvPr id="5" name="TextBox 4"/>
+          <p:cNvSpPr txBox="1"/>
+          <p:nvPr/>
+        </p:nvSpPr>
+        <p:spPr>
+          <a:xfrm>
+            <a:off x="1632856" y="1399593"/>
+            <a:ext cx="8210939" cy="677108"/>
+          </a:xfrm>
+          <a:prstGeom prst="rect">
+            <a:avLst/>
+          </a:prstGeom>
+          <a:noFill/>
+          <a:ln>
+            <a:solidFill>
+              <a:schemeClr val="tx1"/>
+            </a:solidFill>
+          </a:ln>
+        </p:spPr>
+        <p:txBody>
+          <a:bodyPr wrap="square" rtlCol="0">
+            <a:spAutoFit/>
+          </a:bodyPr>
+          <a:lstStyle/>
+          <a:p>
+            <a:r>
+              <a:rPr lang="en-US" sz="2000" dirty="0" smtClean="0">
+                <a:latin typeface="Arial Black" panose="020B0A04020102020204" pitchFamily="34" charset="0"/>
+              </a:rPr>
+              <a:t>INFORMATION SCHEMA:</a:t>
+            </a:r>
+            <a:r>
+              <a:rPr lang="en-US" dirty="0" smtClean="0"/>
+              <a:t> It is used to see the constraint on the column of the table </a:t>
+            </a:r>
+            <a:endParaRPr lang="en-IN" dirty="0"/>
+          </a:p>
+        </p:txBody>
+      </p:sp>
+    </p:spTree>
+    <p:extLst>
+      <p:ext uri="{BB962C8B-B14F-4D97-AF65-F5344CB8AC3E}">
+        <p14:creationId xmlns:p14="http://schemas.microsoft.com/office/powerpoint/2010/main" val="1649278258"/>
       </p:ext>
     </p:extLst>
   </p:cSld>
@@ -11888,6 +12407,789 @@
 </p:sld>
 </file>
 
+<file path=ppt/slides/slide60.xml><?xml version="1.0" encoding="utf-8"?>
+<p:sld xmlns:a="http://schemas.openxmlformats.org/drawingml/2006/main" xmlns:r="http://schemas.openxmlformats.org/officeDocument/2006/relationships" xmlns:p="http://schemas.openxmlformats.org/presentationml/2006/main">
+  <p:cSld>
+    <p:spTree>
+      <p:nvGrpSpPr>
+        <p:cNvPr id="1" name=""/>
+        <p:cNvGrpSpPr/>
+        <p:nvPr/>
+      </p:nvGrpSpPr>
+      <p:grpSpPr>
+        <a:xfrm>
+          <a:off x="0" y="0"/>
+          <a:ext cx="0" cy="0"/>
+          <a:chOff x="0" y="0"/>
+          <a:chExt cx="0" cy="0"/>
+        </a:xfrm>
+      </p:grpSpPr>
+      <p:sp>
+        <p:nvSpPr>
+          <p:cNvPr id="2" name="TextBox 1"/>
+          <p:cNvSpPr txBox="1"/>
+          <p:nvPr/>
+        </p:nvSpPr>
+        <p:spPr>
+          <a:xfrm>
+            <a:off x="774440" y="233265"/>
+            <a:ext cx="10291666" cy="430887"/>
+          </a:xfrm>
+          <a:prstGeom prst="rect">
+            <a:avLst/>
+          </a:prstGeom>
+          <a:noFill/>
+        </p:spPr>
+        <p:txBody>
+          <a:bodyPr wrap="square" rtlCol="0">
+            <a:spAutoFit/>
+          </a:bodyPr>
+          <a:lstStyle/>
+          <a:p>
+            <a:pPr algn="ctr"/>
+            <a:r>
+              <a:rPr lang="en-IN" sz="2200" dirty="0" smtClean="0">
+                <a:latin typeface="Arial Black" panose="020B0A04020102020204" pitchFamily="34" charset="0"/>
+              </a:rPr>
+              <a:t>Queries</a:t>
+            </a:r>
+            <a:endParaRPr lang="en-IN" sz="2200" dirty="0">
+              <a:latin typeface="Arial Black" panose="020B0A04020102020204" pitchFamily="34" charset="0"/>
+            </a:endParaRPr>
+          </a:p>
+        </p:txBody>
+      </p:sp>
+      <p:sp>
+        <p:nvSpPr>
+          <p:cNvPr id="3" name="TextBox 2"/>
+          <p:cNvSpPr txBox="1"/>
+          <p:nvPr/>
+        </p:nvSpPr>
+        <p:spPr>
+          <a:xfrm>
+            <a:off x="1744824" y="1287624"/>
+            <a:ext cx="7837715" cy="1323439"/>
+          </a:xfrm>
+          <a:prstGeom prst="rect">
+            <a:avLst/>
+          </a:prstGeom>
+          <a:noFill/>
+          <a:ln>
+            <a:solidFill>
+              <a:schemeClr val="tx1"/>
+            </a:solidFill>
+          </a:ln>
+        </p:spPr>
+        <p:txBody>
+          <a:bodyPr wrap="square" rtlCol="0">
+            <a:spAutoFit/>
+          </a:bodyPr>
+          <a:lstStyle/>
+          <a:p>
+            <a:r>
+              <a:rPr lang="en-US" sz="2000" dirty="0" smtClean="0">
+                <a:latin typeface="Arial Black" panose="020B0A04020102020204" pitchFamily="34" charset="0"/>
+              </a:rPr>
+              <a:t>FOREIGN KEY: </a:t>
+            </a:r>
+            <a:r>
+              <a:rPr lang="en-US" sz="2000" dirty="0" smtClean="0"/>
+              <a:t>It is a column or set of columns in one table that refers to the primary key in another table</a:t>
+            </a:r>
+          </a:p>
+          <a:p>
+            <a:endParaRPr lang="en-US" sz="2000" dirty="0"/>
+          </a:p>
+          <a:p>
+            <a:r>
+              <a:rPr lang="en-US" sz="2000" dirty="0" smtClean="0"/>
+              <a:t>It is also known as the Referential Integrity</a:t>
+            </a:r>
+            <a:endParaRPr lang="en-IN" sz="2000" dirty="0"/>
+          </a:p>
+        </p:txBody>
+      </p:sp>
+      <p:sp>
+        <p:nvSpPr>
+          <p:cNvPr id="4" name="TextBox 3"/>
+          <p:cNvSpPr txBox="1"/>
+          <p:nvPr/>
+        </p:nvSpPr>
+        <p:spPr>
+          <a:xfrm>
+            <a:off x="1744824" y="2864498"/>
+            <a:ext cx="7156580" cy="369332"/>
+          </a:xfrm>
+          <a:prstGeom prst="rect">
+            <a:avLst/>
+          </a:prstGeom>
+          <a:noFill/>
+        </p:spPr>
+        <p:txBody>
+          <a:bodyPr wrap="square" rtlCol="0">
+            <a:spAutoFit/>
+          </a:bodyPr>
+          <a:lstStyle/>
+          <a:p>
+            <a:r>
+              <a:rPr lang="en-US" dirty="0" smtClean="0"/>
+              <a:t>In this project, I have used dept_id as a foreign key in the dr_name table</a:t>
+            </a:r>
+          </a:p>
+        </p:txBody>
+      </p:sp>
+      <p:pic>
+        <p:nvPicPr>
+          <p:cNvPr id="5" name="Picture 4"/>
+          <p:cNvPicPr>
+            <a:picLocks noChangeAspect="1"/>
+          </p:cNvPicPr>
+          <p:nvPr/>
+        </p:nvPicPr>
+        <p:blipFill>
+          <a:blip r:embed="rId2"/>
+          <a:stretch>
+            <a:fillRect/>
+          </a:stretch>
+        </p:blipFill>
+        <p:spPr>
+          <a:xfrm>
+            <a:off x="1744824" y="4918493"/>
+            <a:ext cx="4599992" cy="1647889"/>
+          </a:xfrm>
+          <a:prstGeom prst="rect">
+            <a:avLst/>
+          </a:prstGeom>
+        </p:spPr>
+      </p:pic>
+      <p:pic>
+        <p:nvPicPr>
+          <p:cNvPr id="6" name="Picture 5"/>
+          <p:cNvPicPr>
+            <a:picLocks noChangeAspect="1"/>
+          </p:cNvPicPr>
+          <p:nvPr/>
+        </p:nvPicPr>
+        <p:blipFill>
+          <a:blip r:embed="rId3">
+            <a:extLst>
+              <a:ext uri="{28A0092B-C50C-407E-A947-70E740481C1C}">
+                <a14:useLocalDpi xmlns:a14="http://schemas.microsoft.com/office/drawing/2010/main" val="0"/>
+              </a:ext>
+            </a:extLst>
+          </a:blip>
+          <a:stretch>
+            <a:fillRect/>
+          </a:stretch>
+        </p:blipFill>
+        <p:spPr>
+          <a:xfrm>
+            <a:off x="1744824" y="3487265"/>
+            <a:ext cx="3788229" cy="1265613"/>
+          </a:xfrm>
+          <a:prstGeom prst="rect">
+            <a:avLst/>
+          </a:prstGeom>
+        </p:spPr>
+      </p:pic>
+    </p:spTree>
+    <p:extLst>
+      <p:ext uri="{BB962C8B-B14F-4D97-AF65-F5344CB8AC3E}">
+        <p14:creationId xmlns:p14="http://schemas.microsoft.com/office/powerpoint/2010/main" val="1483860647"/>
+      </p:ext>
+    </p:extLst>
+  </p:cSld>
+  <p:clrMapOvr>
+    <a:masterClrMapping/>
+  </p:clrMapOvr>
+</p:sld>
+</file>
+
+<file path=ppt/slides/slide61.xml><?xml version="1.0" encoding="utf-8"?>
+<p:sld xmlns:a="http://schemas.openxmlformats.org/drawingml/2006/main" xmlns:r="http://schemas.openxmlformats.org/officeDocument/2006/relationships" xmlns:p="http://schemas.openxmlformats.org/presentationml/2006/main">
+  <p:cSld>
+    <p:spTree>
+      <p:nvGrpSpPr>
+        <p:cNvPr id="1" name=""/>
+        <p:cNvGrpSpPr/>
+        <p:nvPr/>
+      </p:nvGrpSpPr>
+      <p:grpSpPr>
+        <a:xfrm>
+          <a:off x="0" y="0"/>
+          <a:ext cx="0" cy="0"/>
+          <a:chOff x="0" y="0"/>
+          <a:chExt cx="0" cy="0"/>
+        </a:xfrm>
+      </p:grpSpPr>
+      <p:sp>
+        <p:nvSpPr>
+          <p:cNvPr id="2" name="TextBox 1"/>
+          <p:cNvSpPr txBox="1"/>
+          <p:nvPr/>
+        </p:nvSpPr>
+        <p:spPr>
+          <a:xfrm>
+            <a:off x="774440" y="233265"/>
+            <a:ext cx="10291666" cy="430887"/>
+          </a:xfrm>
+          <a:prstGeom prst="rect">
+            <a:avLst/>
+          </a:prstGeom>
+          <a:noFill/>
+        </p:spPr>
+        <p:txBody>
+          <a:bodyPr wrap="square" rtlCol="0">
+            <a:spAutoFit/>
+          </a:bodyPr>
+          <a:lstStyle/>
+          <a:p>
+            <a:pPr algn="ctr"/>
+            <a:r>
+              <a:rPr lang="en-IN" sz="2200" dirty="0" smtClean="0">
+                <a:latin typeface="Arial Black" panose="020B0A04020102020204" pitchFamily="34" charset="0"/>
+              </a:rPr>
+              <a:t>Queries</a:t>
+            </a:r>
+            <a:endParaRPr lang="en-IN" sz="2200" dirty="0">
+              <a:latin typeface="Arial Black" panose="020B0A04020102020204" pitchFamily="34" charset="0"/>
+            </a:endParaRPr>
+          </a:p>
+        </p:txBody>
+      </p:sp>
+    </p:spTree>
+    <p:extLst>
+      <p:ext uri="{BB962C8B-B14F-4D97-AF65-F5344CB8AC3E}">
+        <p14:creationId xmlns:p14="http://schemas.microsoft.com/office/powerpoint/2010/main" val="1211764321"/>
+      </p:ext>
+    </p:extLst>
+  </p:cSld>
+  <p:clrMapOvr>
+    <a:masterClrMapping/>
+  </p:clrMapOvr>
+</p:sld>
+</file>
+
+<file path=ppt/slides/slide62.xml><?xml version="1.0" encoding="utf-8"?>
+<p:sld xmlns:a="http://schemas.openxmlformats.org/drawingml/2006/main" xmlns:r="http://schemas.openxmlformats.org/officeDocument/2006/relationships" xmlns:p="http://schemas.openxmlformats.org/presentationml/2006/main">
+  <p:cSld>
+    <p:spTree>
+      <p:nvGrpSpPr>
+        <p:cNvPr id="1" name=""/>
+        <p:cNvGrpSpPr/>
+        <p:nvPr/>
+      </p:nvGrpSpPr>
+      <p:grpSpPr>
+        <a:xfrm>
+          <a:off x="0" y="0"/>
+          <a:ext cx="0" cy="0"/>
+          <a:chOff x="0" y="0"/>
+          <a:chExt cx="0" cy="0"/>
+        </a:xfrm>
+      </p:grpSpPr>
+      <p:sp>
+        <p:nvSpPr>
+          <p:cNvPr id="2" name="TextBox 1"/>
+          <p:cNvSpPr txBox="1"/>
+          <p:nvPr/>
+        </p:nvSpPr>
+        <p:spPr>
+          <a:xfrm>
+            <a:off x="774440" y="233265"/>
+            <a:ext cx="10291666" cy="430887"/>
+          </a:xfrm>
+          <a:prstGeom prst="rect">
+            <a:avLst/>
+          </a:prstGeom>
+          <a:noFill/>
+        </p:spPr>
+        <p:txBody>
+          <a:bodyPr wrap="square" rtlCol="0">
+            <a:spAutoFit/>
+          </a:bodyPr>
+          <a:lstStyle/>
+          <a:p>
+            <a:pPr algn="ctr"/>
+            <a:r>
+              <a:rPr lang="en-IN" sz="2200" dirty="0" smtClean="0">
+                <a:latin typeface="Arial Black" panose="020B0A04020102020204" pitchFamily="34" charset="0"/>
+              </a:rPr>
+              <a:t>Queries</a:t>
+            </a:r>
+            <a:endParaRPr lang="en-IN" sz="2200" dirty="0">
+              <a:latin typeface="Arial Black" panose="020B0A04020102020204" pitchFamily="34" charset="0"/>
+            </a:endParaRPr>
+          </a:p>
+        </p:txBody>
+      </p:sp>
+    </p:spTree>
+    <p:extLst>
+      <p:ext uri="{BB962C8B-B14F-4D97-AF65-F5344CB8AC3E}">
+        <p14:creationId xmlns:p14="http://schemas.microsoft.com/office/powerpoint/2010/main" val="1250816044"/>
+      </p:ext>
+    </p:extLst>
+  </p:cSld>
+  <p:clrMapOvr>
+    <a:masterClrMapping/>
+  </p:clrMapOvr>
+</p:sld>
+</file>
+
+<file path=ppt/slides/slide63.xml><?xml version="1.0" encoding="utf-8"?>
+<p:sld xmlns:a="http://schemas.openxmlformats.org/drawingml/2006/main" xmlns:r="http://schemas.openxmlformats.org/officeDocument/2006/relationships" xmlns:p="http://schemas.openxmlformats.org/presentationml/2006/main">
+  <p:cSld>
+    <p:spTree>
+      <p:nvGrpSpPr>
+        <p:cNvPr id="1" name=""/>
+        <p:cNvGrpSpPr/>
+        <p:nvPr/>
+      </p:nvGrpSpPr>
+      <p:grpSpPr>
+        <a:xfrm>
+          <a:off x="0" y="0"/>
+          <a:ext cx="0" cy="0"/>
+          <a:chOff x="0" y="0"/>
+          <a:chExt cx="0" cy="0"/>
+        </a:xfrm>
+      </p:grpSpPr>
+      <p:sp>
+        <p:nvSpPr>
+          <p:cNvPr id="2" name="TextBox 1"/>
+          <p:cNvSpPr txBox="1"/>
+          <p:nvPr/>
+        </p:nvSpPr>
+        <p:spPr>
+          <a:xfrm>
+            <a:off x="774440" y="233265"/>
+            <a:ext cx="10291666" cy="430887"/>
+          </a:xfrm>
+          <a:prstGeom prst="rect">
+            <a:avLst/>
+          </a:prstGeom>
+          <a:noFill/>
+        </p:spPr>
+        <p:txBody>
+          <a:bodyPr wrap="square" rtlCol="0">
+            <a:spAutoFit/>
+          </a:bodyPr>
+          <a:lstStyle/>
+          <a:p>
+            <a:pPr algn="ctr"/>
+            <a:r>
+              <a:rPr lang="en-IN" sz="2200" dirty="0" smtClean="0">
+                <a:latin typeface="Arial Black" panose="020B0A04020102020204" pitchFamily="34" charset="0"/>
+              </a:rPr>
+              <a:t>Queries</a:t>
+            </a:r>
+            <a:endParaRPr lang="en-IN" sz="2200" dirty="0">
+              <a:latin typeface="Arial Black" panose="020B0A04020102020204" pitchFamily="34" charset="0"/>
+            </a:endParaRPr>
+          </a:p>
+        </p:txBody>
+      </p:sp>
+    </p:spTree>
+    <p:extLst>
+      <p:ext uri="{BB962C8B-B14F-4D97-AF65-F5344CB8AC3E}">
+        <p14:creationId xmlns:p14="http://schemas.microsoft.com/office/powerpoint/2010/main" val="903094364"/>
+      </p:ext>
+    </p:extLst>
+  </p:cSld>
+  <p:clrMapOvr>
+    <a:masterClrMapping/>
+  </p:clrMapOvr>
+</p:sld>
+</file>
+
+<file path=ppt/slides/slide64.xml><?xml version="1.0" encoding="utf-8"?>
+<p:sld xmlns:a="http://schemas.openxmlformats.org/drawingml/2006/main" xmlns:r="http://schemas.openxmlformats.org/officeDocument/2006/relationships" xmlns:p="http://schemas.openxmlformats.org/presentationml/2006/main">
+  <p:cSld>
+    <p:spTree>
+      <p:nvGrpSpPr>
+        <p:cNvPr id="1" name=""/>
+        <p:cNvGrpSpPr/>
+        <p:nvPr/>
+      </p:nvGrpSpPr>
+      <p:grpSpPr>
+        <a:xfrm>
+          <a:off x="0" y="0"/>
+          <a:ext cx="0" cy="0"/>
+          <a:chOff x="0" y="0"/>
+          <a:chExt cx="0" cy="0"/>
+        </a:xfrm>
+      </p:grpSpPr>
+      <p:sp>
+        <p:nvSpPr>
+          <p:cNvPr id="2" name="TextBox 1"/>
+          <p:cNvSpPr txBox="1"/>
+          <p:nvPr/>
+        </p:nvSpPr>
+        <p:spPr>
+          <a:xfrm>
+            <a:off x="774440" y="233265"/>
+            <a:ext cx="10291666" cy="430887"/>
+          </a:xfrm>
+          <a:prstGeom prst="rect">
+            <a:avLst/>
+          </a:prstGeom>
+          <a:noFill/>
+        </p:spPr>
+        <p:txBody>
+          <a:bodyPr wrap="square" rtlCol="0">
+            <a:spAutoFit/>
+          </a:bodyPr>
+          <a:lstStyle/>
+          <a:p>
+            <a:pPr algn="ctr"/>
+            <a:r>
+              <a:rPr lang="en-IN" sz="2200" dirty="0" smtClean="0">
+                <a:latin typeface="Arial Black" panose="020B0A04020102020204" pitchFamily="34" charset="0"/>
+              </a:rPr>
+              <a:t>Queries</a:t>
+            </a:r>
+            <a:endParaRPr lang="en-IN" sz="2200" dirty="0">
+              <a:latin typeface="Arial Black" panose="020B0A04020102020204" pitchFamily="34" charset="0"/>
+            </a:endParaRPr>
+          </a:p>
+        </p:txBody>
+      </p:sp>
+    </p:spTree>
+    <p:extLst>
+      <p:ext uri="{BB962C8B-B14F-4D97-AF65-F5344CB8AC3E}">
+        <p14:creationId xmlns:p14="http://schemas.microsoft.com/office/powerpoint/2010/main" val="897756096"/>
+      </p:ext>
+    </p:extLst>
+  </p:cSld>
+  <p:clrMapOvr>
+    <a:masterClrMapping/>
+  </p:clrMapOvr>
+</p:sld>
+</file>
+
+<file path=ppt/slides/slide65.xml><?xml version="1.0" encoding="utf-8"?>
+<p:sld xmlns:a="http://schemas.openxmlformats.org/drawingml/2006/main" xmlns:r="http://schemas.openxmlformats.org/officeDocument/2006/relationships" xmlns:p="http://schemas.openxmlformats.org/presentationml/2006/main">
+  <p:cSld>
+    <p:spTree>
+      <p:nvGrpSpPr>
+        <p:cNvPr id="1" name=""/>
+        <p:cNvGrpSpPr/>
+        <p:nvPr/>
+      </p:nvGrpSpPr>
+      <p:grpSpPr>
+        <a:xfrm>
+          <a:off x="0" y="0"/>
+          <a:ext cx="0" cy="0"/>
+          <a:chOff x="0" y="0"/>
+          <a:chExt cx="0" cy="0"/>
+        </a:xfrm>
+      </p:grpSpPr>
+      <p:sp>
+        <p:nvSpPr>
+          <p:cNvPr id="2" name="TextBox 1"/>
+          <p:cNvSpPr txBox="1"/>
+          <p:nvPr/>
+        </p:nvSpPr>
+        <p:spPr>
+          <a:xfrm>
+            <a:off x="774440" y="233265"/>
+            <a:ext cx="10291666" cy="430887"/>
+          </a:xfrm>
+          <a:prstGeom prst="rect">
+            <a:avLst/>
+          </a:prstGeom>
+          <a:noFill/>
+        </p:spPr>
+        <p:txBody>
+          <a:bodyPr wrap="square" rtlCol="0">
+            <a:spAutoFit/>
+          </a:bodyPr>
+          <a:lstStyle/>
+          <a:p>
+            <a:pPr algn="ctr"/>
+            <a:r>
+              <a:rPr lang="en-IN" sz="2200" dirty="0" smtClean="0">
+                <a:latin typeface="Arial Black" panose="020B0A04020102020204" pitchFamily="34" charset="0"/>
+              </a:rPr>
+              <a:t>Queries</a:t>
+            </a:r>
+            <a:endParaRPr lang="en-IN" sz="2200" dirty="0">
+              <a:latin typeface="Arial Black" panose="020B0A04020102020204" pitchFamily="34" charset="0"/>
+            </a:endParaRPr>
+          </a:p>
+        </p:txBody>
+      </p:sp>
+    </p:spTree>
+    <p:extLst>
+      <p:ext uri="{BB962C8B-B14F-4D97-AF65-F5344CB8AC3E}">
+        <p14:creationId xmlns:p14="http://schemas.microsoft.com/office/powerpoint/2010/main" val="1788951423"/>
+      </p:ext>
+    </p:extLst>
+  </p:cSld>
+  <p:clrMapOvr>
+    <a:masterClrMapping/>
+  </p:clrMapOvr>
+</p:sld>
+</file>
+
+<file path=ppt/slides/slide66.xml><?xml version="1.0" encoding="utf-8"?>
+<p:sld xmlns:a="http://schemas.openxmlformats.org/drawingml/2006/main" xmlns:r="http://schemas.openxmlformats.org/officeDocument/2006/relationships" xmlns:p="http://schemas.openxmlformats.org/presentationml/2006/main">
+  <p:cSld>
+    <p:spTree>
+      <p:nvGrpSpPr>
+        <p:cNvPr id="1" name=""/>
+        <p:cNvGrpSpPr/>
+        <p:nvPr/>
+      </p:nvGrpSpPr>
+      <p:grpSpPr>
+        <a:xfrm>
+          <a:off x="0" y="0"/>
+          <a:ext cx="0" cy="0"/>
+          <a:chOff x="0" y="0"/>
+          <a:chExt cx="0" cy="0"/>
+        </a:xfrm>
+      </p:grpSpPr>
+      <p:sp>
+        <p:nvSpPr>
+          <p:cNvPr id="2" name="TextBox 1"/>
+          <p:cNvSpPr txBox="1"/>
+          <p:nvPr/>
+        </p:nvSpPr>
+        <p:spPr>
+          <a:xfrm>
+            <a:off x="774440" y="233265"/>
+            <a:ext cx="10291666" cy="430887"/>
+          </a:xfrm>
+          <a:prstGeom prst="rect">
+            <a:avLst/>
+          </a:prstGeom>
+          <a:noFill/>
+        </p:spPr>
+        <p:txBody>
+          <a:bodyPr wrap="square" rtlCol="0">
+            <a:spAutoFit/>
+          </a:bodyPr>
+          <a:lstStyle/>
+          <a:p>
+            <a:pPr algn="ctr"/>
+            <a:r>
+              <a:rPr lang="en-IN" sz="2200" dirty="0" smtClean="0">
+                <a:latin typeface="Arial Black" panose="020B0A04020102020204" pitchFamily="34" charset="0"/>
+              </a:rPr>
+              <a:t>Queries</a:t>
+            </a:r>
+            <a:endParaRPr lang="en-IN" sz="2200" dirty="0">
+              <a:latin typeface="Arial Black" panose="020B0A04020102020204" pitchFamily="34" charset="0"/>
+            </a:endParaRPr>
+          </a:p>
+        </p:txBody>
+      </p:sp>
+    </p:spTree>
+    <p:extLst>
+      <p:ext uri="{BB962C8B-B14F-4D97-AF65-F5344CB8AC3E}">
+        <p14:creationId xmlns:p14="http://schemas.microsoft.com/office/powerpoint/2010/main" val="2524548376"/>
+      </p:ext>
+    </p:extLst>
+  </p:cSld>
+  <p:clrMapOvr>
+    <a:masterClrMapping/>
+  </p:clrMapOvr>
+</p:sld>
+</file>
+
+<file path=ppt/slides/slide67.xml><?xml version="1.0" encoding="utf-8"?>
+<p:sld xmlns:a="http://schemas.openxmlformats.org/drawingml/2006/main" xmlns:r="http://schemas.openxmlformats.org/officeDocument/2006/relationships" xmlns:p="http://schemas.openxmlformats.org/presentationml/2006/main">
+  <p:cSld>
+    <p:spTree>
+      <p:nvGrpSpPr>
+        <p:cNvPr id="1" name=""/>
+        <p:cNvGrpSpPr/>
+        <p:nvPr/>
+      </p:nvGrpSpPr>
+      <p:grpSpPr>
+        <a:xfrm>
+          <a:off x="0" y="0"/>
+          <a:ext cx="0" cy="0"/>
+          <a:chOff x="0" y="0"/>
+          <a:chExt cx="0" cy="0"/>
+        </a:xfrm>
+      </p:grpSpPr>
+      <p:sp>
+        <p:nvSpPr>
+          <p:cNvPr id="2" name="TextBox 1"/>
+          <p:cNvSpPr txBox="1"/>
+          <p:nvPr/>
+        </p:nvSpPr>
+        <p:spPr>
+          <a:xfrm>
+            <a:off x="774440" y="233265"/>
+            <a:ext cx="10291666" cy="430887"/>
+          </a:xfrm>
+          <a:prstGeom prst="rect">
+            <a:avLst/>
+          </a:prstGeom>
+          <a:noFill/>
+        </p:spPr>
+        <p:txBody>
+          <a:bodyPr wrap="square" rtlCol="0">
+            <a:spAutoFit/>
+          </a:bodyPr>
+          <a:lstStyle/>
+          <a:p>
+            <a:pPr algn="ctr"/>
+            <a:r>
+              <a:rPr lang="en-IN" sz="2200" dirty="0" smtClean="0">
+                <a:latin typeface="Arial Black" panose="020B0A04020102020204" pitchFamily="34" charset="0"/>
+              </a:rPr>
+              <a:t>Queries</a:t>
+            </a:r>
+            <a:endParaRPr lang="en-IN" sz="2200" dirty="0">
+              <a:latin typeface="Arial Black" panose="020B0A04020102020204" pitchFamily="34" charset="0"/>
+            </a:endParaRPr>
+          </a:p>
+        </p:txBody>
+      </p:sp>
+    </p:spTree>
+    <p:extLst>
+      <p:ext uri="{BB962C8B-B14F-4D97-AF65-F5344CB8AC3E}">
+        <p14:creationId xmlns:p14="http://schemas.microsoft.com/office/powerpoint/2010/main" val="2550480579"/>
+      </p:ext>
+    </p:extLst>
+  </p:cSld>
+  <p:clrMapOvr>
+    <a:masterClrMapping/>
+  </p:clrMapOvr>
+</p:sld>
+</file>
+
+<file path=ppt/slides/slide68.xml><?xml version="1.0" encoding="utf-8"?>
+<p:sld xmlns:a="http://schemas.openxmlformats.org/drawingml/2006/main" xmlns:r="http://schemas.openxmlformats.org/officeDocument/2006/relationships" xmlns:p="http://schemas.openxmlformats.org/presentationml/2006/main">
+  <p:cSld>
+    <p:spTree>
+      <p:nvGrpSpPr>
+        <p:cNvPr id="1" name=""/>
+        <p:cNvGrpSpPr/>
+        <p:nvPr/>
+      </p:nvGrpSpPr>
+      <p:grpSpPr>
+        <a:xfrm>
+          <a:off x="0" y="0"/>
+          <a:ext cx="0" cy="0"/>
+          <a:chOff x="0" y="0"/>
+          <a:chExt cx="0" cy="0"/>
+        </a:xfrm>
+      </p:grpSpPr>
+      <p:sp>
+        <p:nvSpPr>
+          <p:cNvPr id="2" name="TextBox 1"/>
+          <p:cNvSpPr txBox="1"/>
+          <p:nvPr/>
+        </p:nvSpPr>
+        <p:spPr>
+          <a:xfrm>
+            <a:off x="774440" y="233265"/>
+            <a:ext cx="10291666" cy="430887"/>
+          </a:xfrm>
+          <a:prstGeom prst="rect">
+            <a:avLst/>
+          </a:prstGeom>
+          <a:noFill/>
+        </p:spPr>
+        <p:txBody>
+          <a:bodyPr wrap="square" rtlCol="0">
+            <a:spAutoFit/>
+          </a:bodyPr>
+          <a:lstStyle/>
+          <a:p>
+            <a:pPr algn="ctr"/>
+            <a:r>
+              <a:rPr lang="en-IN" sz="2200" dirty="0" smtClean="0">
+                <a:latin typeface="Arial Black" panose="020B0A04020102020204" pitchFamily="34" charset="0"/>
+              </a:rPr>
+              <a:t>Queries</a:t>
+            </a:r>
+            <a:endParaRPr lang="en-IN" sz="2200" dirty="0">
+              <a:latin typeface="Arial Black" panose="020B0A04020102020204" pitchFamily="34" charset="0"/>
+            </a:endParaRPr>
+          </a:p>
+        </p:txBody>
+      </p:sp>
+    </p:spTree>
+    <p:extLst>
+      <p:ext uri="{BB962C8B-B14F-4D97-AF65-F5344CB8AC3E}">
+        <p14:creationId xmlns:p14="http://schemas.microsoft.com/office/powerpoint/2010/main" val="3267014141"/>
+      </p:ext>
+    </p:extLst>
+  </p:cSld>
+  <p:clrMapOvr>
+    <a:masterClrMapping/>
+  </p:clrMapOvr>
+</p:sld>
+</file>
+
+<file path=ppt/slides/slide69.xml><?xml version="1.0" encoding="utf-8"?>
+<p:sld xmlns:a="http://schemas.openxmlformats.org/drawingml/2006/main" xmlns:r="http://schemas.openxmlformats.org/officeDocument/2006/relationships" xmlns:p="http://schemas.openxmlformats.org/presentationml/2006/main">
+  <p:cSld>
+    <p:spTree>
+      <p:nvGrpSpPr>
+        <p:cNvPr id="1" name=""/>
+        <p:cNvGrpSpPr/>
+        <p:nvPr/>
+      </p:nvGrpSpPr>
+      <p:grpSpPr>
+        <a:xfrm>
+          <a:off x="0" y="0"/>
+          <a:ext cx="0" cy="0"/>
+          <a:chOff x="0" y="0"/>
+          <a:chExt cx="0" cy="0"/>
+        </a:xfrm>
+      </p:grpSpPr>
+      <p:sp>
+        <p:nvSpPr>
+          <p:cNvPr id="2" name="TextBox 1"/>
+          <p:cNvSpPr txBox="1"/>
+          <p:nvPr/>
+        </p:nvSpPr>
+        <p:spPr>
+          <a:xfrm>
+            <a:off x="774440" y="233265"/>
+            <a:ext cx="10291666" cy="430887"/>
+          </a:xfrm>
+          <a:prstGeom prst="rect">
+            <a:avLst/>
+          </a:prstGeom>
+          <a:noFill/>
+        </p:spPr>
+        <p:txBody>
+          <a:bodyPr wrap="square" rtlCol="0">
+            <a:spAutoFit/>
+          </a:bodyPr>
+          <a:lstStyle/>
+          <a:p>
+            <a:pPr algn="ctr"/>
+            <a:r>
+              <a:rPr lang="en-IN" sz="2200" dirty="0" smtClean="0">
+                <a:latin typeface="Arial Black" panose="020B0A04020102020204" pitchFamily="34" charset="0"/>
+              </a:rPr>
+              <a:t>Queries</a:t>
+            </a:r>
+            <a:endParaRPr lang="en-IN" sz="2200" dirty="0">
+              <a:latin typeface="Arial Black" panose="020B0A04020102020204" pitchFamily="34" charset="0"/>
+            </a:endParaRPr>
+          </a:p>
+        </p:txBody>
+      </p:sp>
+    </p:spTree>
+    <p:extLst>
+      <p:ext uri="{BB962C8B-B14F-4D97-AF65-F5344CB8AC3E}">
+        <p14:creationId xmlns:p14="http://schemas.microsoft.com/office/powerpoint/2010/main" val="1871181710"/>
+      </p:ext>
+    </p:extLst>
+  </p:cSld>
+  <p:clrMapOvr>
+    <a:masterClrMapping/>
+  </p:clrMapOvr>
+</p:sld>
+</file>
+
 <file path=ppt/slides/slide7.xml><?xml version="1.0" encoding="utf-8"?>
 <p:sld xmlns:a="http://schemas.openxmlformats.org/drawingml/2006/main" xmlns:r="http://schemas.openxmlformats.org/officeDocument/2006/relationships" xmlns:p="http://schemas.openxmlformats.org/presentationml/2006/main">
   <p:cSld>
@@ -11979,6 +13281,71 @@
     <p:extLst>
       <p:ext uri="{BB962C8B-B14F-4D97-AF65-F5344CB8AC3E}">
         <p14:creationId xmlns:p14="http://schemas.microsoft.com/office/powerpoint/2010/main" val="1896939268"/>
+      </p:ext>
+    </p:extLst>
+  </p:cSld>
+  <p:clrMapOvr>
+    <a:masterClrMapping/>
+  </p:clrMapOvr>
+</p:sld>
+</file>
+
+<file path=ppt/slides/slide70.xml><?xml version="1.0" encoding="utf-8"?>
+<p:sld xmlns:a="http://schemas.openxmlformats.org/drawingml/2006/main" xmlns:r="http://schemas.openxmlformats.org/officeDocument/2006/relationships" xmlns:p="http://schemas.openxmlformats.org/presentationml/2006/main">
+  <p:cSld>
+    <p:spTree>
+      <p:nvGrpSpPr>
+        <p:cNvPr id="1" name=""/>
+        <p:cNvGrpSpPr/>
+        <p:nvPr/>
+      </p:nvGrpSpPr>
+      <p:grpSpPr>
+        <a:xfrm>
+          <a:off x="0" y="0"/>
+          <a:ext cx="0" cy="0"/>
+          <a:chOff x="0" y="0"/>
+          <a:chExt cx="0" cy="0"/>
+        </a:xfrm>
+      </p:grpSpPr>
+      <p:sp>
+        <p:nvSpPr>
+          <p:cNvPr id="2" name="TextBox 1"/>
+          <p:cNvSpPr txBox="1"/>
+          <p:nvPr/>
+        </p:nvSpPr>
+        <p:spPr>
+          <a:xfrm>
+            <a:off x="774440" y="233265"/>
+            <a:ext cx="10291666" cy="430887"/>
+          </a:xfrm>
+          <a:prstGeom prst="rect">
+            <a:avLst/>
+          </a:prstGeom>
+          <a:noFill/>
+        </p:spPr>
+        <p:txBody>
+          <a:bodyPr wrap="square" rtlCol="0">
+            <a:spAutoFit/>
+          </a:bodyPr>
+          <a:lstStyle/>
+          <a:p>
+            <a:pPr algn="ctr"/>
+            <a:r>
+              <a:rPr lang="en-IN" sz="2200" dirty="0" smtClean="0">
+                <a:latin typeface="Arial Black" panose="020B0A04020102020204" pitchFamily="34" charset="0"/>
+              </a:rPr>
+              <a:t>Queries</a:t>
+            </a:r>
+            <a:endParaRPr lang="en-IN" sz="2200" dirty="0">
+              <a:latin typeface="Arial Black" panose="020B0A04020102020204" pitchFamily="34" charset="0"/>
+            </a:endParaRPr>
+          </a:p>
+        </p:txBody>
+      </p:sp>
+    </p:spTree>
+    <p:extLst>
+      <p:ext uri="{BB962C8B-B14F-4D97-AF65-F5344CB8AC3E}">
+        <p14:creationId xmlns:p14="http://schemas.microsoft.com/office/powerpoint/2010/main" val="4226547030"/>
       </p:ext>
     </p:extLst>
   </p:cSld>

</xml_diff>